<commit_message>
Revised lesson 1 structure
</commit_message>
<xml_diff>
--- a/001_why_code/001.pptx
+++ b/001_why_code/001.pptx
@@ -204,7 +204,7 @@
           <a:p>
             <a:fld id="{8C30077F-BF0A-F74B-87CD-8405AF275430}" type="datetimeFigureOut">
               <a:rPr lang="en-US" smtClean="0"/>
-              <a:t>5/5/17</a:t>
+              <a:t>5/16/17</a:t>
             </a:fld>
             <a:endParaRPr lang="en-US"/>
           </a:p>
@@ -603,7 +603,7 @@
           <a:p>
             <a:fld id="{6AD8852D-4624-B943-B935-A57BA735AC85}" type="datetimeFigureOut">
               <a:rPr lang="en-US" smtClean="0"/>
-              <a:t>5/5/17</a:t>
+              <a:t>5/16/17</a:t>
             </a:fld>
             <a:endParaRPr lang="en-US"/>
           </a:p>
@@ -768,7 +768,7 @@
           <a:p>
             <a:fld id="{6AD8852D-4624-B943-B935-A57BA735AC85}" type="datetimeFigureOut">
               <a:rPr lang="en-US" smtClean="0"/>
-              <a:t>5/5/17</a:t>
+              <a:t>5/16/17</a:t>
             </a:fld>
             <a:endParaRPr lang="en-US"/>
           </a:p>
@@ -943,7 +943,7 @@
           <a:p>
             <a:fld id="{6AD8852D-4624-B943-B935-A57BA735AC85}" type="datetimeFigureOut">
               <a:rPr lang="en-US" smtClean="0"/>
-              <a:t>5/5/17</a:t>
+              <a:t>5/16/17</a:t>
             </a:fld>
             <a:endParaRPr lang="en-US"/>
           </a:p>
@@ -1108,7 +1108,7 @@
           <a:p>
             <a:fld id="{6AD8852D-4624-B943-B935-A57BA735AC85}" type="datetimeFigureOut">
               <a:rPr lang="en-US" smtClean="0"/>
-              <a:t>5/5/17</a:t>
+              <a:t>5/16/17</a:t>
             </a:fld>
             <a:endParaRPr lang="en-US"/>
           </a:p>
@@ -1349,7 +1349,7 @@
           <a:p>
             <a:fld id="{6AD8852D-4624-B943-B935-A57BA735AC85}" type="datetimeFigureOut">
               <a:rPr lang="en-US" smtClean="0"/>
-              <a:t>5/5/17</a:t>
+              <a:t>5/16/17</a:t>
             </a:fld>
             <a:endParaRPr lang="en-US"/>
           </a:p>
@@ -1576,7 +1576,7 @@
           <a:p>
             <a:fld id="{6AD8852D-4624-B943-B935-A57BA735AC85}" type="datetimeFigureOut">
               <a:rPr lang="en-US" smtClean="0"/>
-              <a:t>5/5/17</a:t>
+              <a:t>5/16/17</a:t>
             </a:fld>
             <a:endParaRPr lang="en-US"/>
           </a:p>
@@ -1938,7 +1938,7 @@
           <a:p>
             <a:fld id="{6AD8852D-4624-B943-B935-A57BA735AC85}" type="datetimeFigureOut">
               <a:rPr lang="en-US" smtClean="0"/>
-              <a:t>5/5/17</a:t>
+              <a:t>5/16/17</a:t>
             </a:fld>
             <a:endParaRPr lang="en-US"/>
           </a:p>
@@ -2051,7 +2051,7 @@
           <a:p>
             <a:fld id="{6AD8852D-4624-B943-B935-A57BA735AC85}" type="datetimeFigureOut">
               <a:rPr lang="en-US" smtClean="0"/>
-              <a:t>5/5/17</a:t>
+              <a:t>5/16/17</a:t>
             </a:fld>
             <a:endParaRPr lang="en-US"/>
           </a:p>
@@ -2141,7 +2141,7 @@
           <a:p>
             <a:fld id="{6AD8852D-4624-B943-B935-A57BA735AC85}" type="datetimeFigureOut">
               <a:rPr lang="en-US" smtClean="0"/>
-              <a:t>5/5/17</a:t>
+              <a:t>5/16/17</a:t>
             </a:fld>
             <a:endParaRPr lang="en-US"/>
           </a:p>
@@ -2413,7 +2413,7 @@
           <a:p>
             <a:fld id="{6AD8852D-4624-B943-B935-A57BA735AC85}" type="datetimeFigureOut">
               <a:rPr lang="en-US" smtClean="0"/>
-              <a:t>5/5/17</a:t>
+              <a:t>5/16/17</a:t>
             </a:fld>
             <a:endParaRPr lang="en-US"/>
           </a:p>
@@ -2665,7 +2665,7 @@
           <a:p>
             <a:fld id="{6AD8852D-4624-B943-B935-A57BA735AC85}" type="datetimeFigureOut">
               <a:rPr lang="en-US" smtClean="0"/>
-              <a:t>5/5/17</a:t>
+              <a:t>5/16/17</a:t>
             </a:fld>
             <a:endParaRPr lang="en-US"/>
           </a:p>
@@ -2873,7 +2873,7 @@
           <a:p>
             <a:fld id="{6AD8852D-4624-B943-B935-A57BA735AC85}" type="datetimeFigureOut">
               <a:rPr lang="en-US" smtClean="0"/>
-              <a:t>5/5/17</a:t>
+              <a:t>5/16/17</a:t>
             </a:fld>
             <a:endParaRPr lang="en-US"/>
           </a:p>
@@ -3550,7 +3550,7 @@
         </p:nvSpPr>
         <p:spPr>
           <a:xfrm>
-            <a:off x="5572017" y="2357718"/>
+            <a:off x="5572017" y="2376006"/>
             <a:ext cx="1676400" cy="1754326"/>
           </a:xfrm>
           <a:prstGeom prst="rect">
@@ -3633,6 +3633,92 @@
           </a:prstGeom>
         </p:spPr>
       </p:pic>
+      <p:sp>
+        <p:nvSpPr>
+          <p:cNvPr id="4" name="TextBox 3"/>
+          <p:cNvSpPr txBox="1"/>
+          <p:nvPr/>
+        </p:nvSpPr>
+        <p:spPr>
+          <a:xfrm>
+            <a:off x="7991855" y="2715768"/>
+            <a:ext cx="2837961" cy="646331"/>
+          </a:xfrm>
+          <a:prstGeom prst="rect">
+            <a:avLst/>
+          </a:prstGeom>
+          <a:noFill/>
+        </p:spPr>
+        <p:txBody>
+          <a:bodyPr wrap="square" rtlCol="0">
+            <a:spAutoFit/>
+          </a:bodyPr>
+          <a:lstStyle/>
+          <a:p>
+            <a:r>
+              <a:rPr lang="en-US" dirty="0" smtClean="0"/>
+              <a:t>These things which describe an object are called </a:t>
+            </a:r>
+            <a:r>
+              <a:rPr lang="en-US" b="1" dirty="0" smtClean="0">
+                <a:solidFill>
+                  <a:srgbClr val="00B050"/>
+                </a:solidFill>
+              </a:rPr>
+              <a:t>data</a:t>
+            </a:r>
+            <a:endParaRPr lang="en-US" b="1" dirty="0">
+              <a:solidFill>
+                <a:srgbClr val="00B050"/>
+              </a:solidFill>
+            </a:endParaRPr>
+          </a:p>
+        </p:txBody>
+      </p:sp>
+      <p:sp>
+        <p:nvSpPr>
+          <p:cNvPr id="5" name="Right Arrow 4"/>
+          <p:cNvSpPr/>
+          <p:nvPr/>
+        </p:nvSpPr>
+        <p:spPr>
+          <a:xfrm rot="10800000">
+            <a:off x="6887229" y="2852928"/>
+            <a:ext cx="722376" cy="228600"/>
+          </a:xfrm>
+          <a:prstGeom prst="rightArrow">
+            <a:avLst/>
+          </a:prstGeom>
+          <a:noFill/>
+          <a:ln w="28575">
+            <a:solidFill>
+              <a:srgbClr val="00B050"/>
+            </a:solidFill>
+          </a:ln>
+        </p:spPr>
+        <p:style>
+          <a:lnRef idx="2">
+            <a:schemeClr val="accent4"/>
+          </a:lnRef>
+          <a:fillRef idx="1">
+            <a:schemeClr val="lt1"/>
+          </a:fillRef>
+          <a:effectRef idx="0">
+            <a:schemeClr val="accent4"/>
+          </a:effectRef>
+          <a:fontRef idx="minor">
+            <a:schemeClr val="dk1"/>
+          </a:fontRef>
+        </p:style>
+        <p:txBody>
+          <a:bodyPr rtlCol="0" anchor="ctr"/>
+          <a:lstStyle/>
+          <a:p>
+            <a:pPr algn="ctr"/>
+            <a:endParaRPr lang="en-US"/>
+          </a:p>
+        </p:txBody>
+      </p:sp>
     </p:spTree>
     <p:extLst>
       <p:ext uri="{BB962C8B-B14F-4D97-AF65-F5344CB8AC3E}">
@@ -3646,9 +3732,124 @@
   <p:timing>
     <p:tnLst>
       <p:par>
-        <p:cTn id="1" dur="indefinite" restart="never" nodeType="tmRoot"/>
+        <p:cTn id="1" dur="indefinite" restart="never" nodeType="tmRoot">
+          <p:childTnLst>
+            <p:seq concurrent="1" nextAc="seek">
+              <p:cTn id="2" dur="indefinite" nodeType="mainSeq">
+                <p:childTnLst>
+                  <p:par>
+                    <p:cTn id="3" fill="hold">
+                      <p:stCondLst>
+                        <p:cond delay="indefinite"/>
+                      </p:stCondLst>
+                      <p:childTnLst>
+                        <p:par>
+                          <p:cTn id="4" fill="hold">
+                            <p:stCondLst>
+                              <p:cond delay="0"/>
+                            </p:stCondLst>
+                            <p:childTnLst>
+                              <p:par>
+                                <p:cTn id="5" presetID="10" presetClass="entr" presetSubtype="0" fill="hold" grpId="0" nodeType="clickEffect">
+                                  <p:stCondLst>
+                                    <p:cond delay="0"/>
+                                  </p:stCondLst>
+                                  <p:childTnLst>
+                                    <p:set>
+                                      <p:cBhvr>
+                                        <p:cTn id="6" dur="1" fill="hold">
+                                          <p:stCondLst>
+                                            <p:cond delay="0"/>
+                                          </p:stCondLst>
+                                        </p:cTn>
+                                        <p:tgtEl>
+                                          <p:spTgt spid="4"/>
+                                        </p:tgtEl>
+                                        <p:attrNameLst>
+                                          <p:attrName>style.visibility</p:attrName>
+                                        </p:attrNameLst>
+                                      </p:cBhvr>
+                                      <p:to>
+                                        <p:strVal val="visible"/>
+                                      </p:to>
+                                    </p:set>
+                                    <p:animEffect transition="in" filter="fade">
+                                      <p:cBhvr>
+                                        <p:cTn id="7" dur="500"/>
+                                        <p:tgtEl>
+                                          <p:spTgt spid="4"/>
+                                        </p:tgtEl>
+                                      </p:cBhvr>
+                                    </p:animEffect>
+                                  </p:childTnLst>
+                                </p:cTn>
+                              </p:par>
+                              <p:par>
+                                <p:cTn id="8" presetID="10" presetClass="entr" presetSubtype="0" fill="hold" grpId="0" nodeType="withEffect">
+                                  <p:stCondLst>
+                                    <p:cond delay="0"/>
+                                  </p:stCondLst>
+                                  <p:childTnLst>
+                                    <p:set>
+                                      <p:cBhvr>
+                                        <p:cTn id="9" dur="1" fill="hold">
+                                          <p:stCondLst>
+                                            <p:cond delay="0"/>
+                                          </p:stCondLst>
+                                        </p:cTn>
+                                        <p:tgtEl>
+                                          <p:spTgt spid="5"/>
+                                        </p:tgtEl>
+                                        <p:attrNameLst>
+                                          <p:attrName>style.visibility</p:attrName>
+                                        </p:attrNameLst>
+                                      </p:cBhvr>
+                                      <p:to>
+                                        <p:strVal val="visible"/>
+                                      </p:to>
+                                    </p:set>
+                                    <p:animEffect transition="in" filter="fade">
+                                      <p:cBhvr>
+                                        <p:cTn id="10" dur="500"/>
+                                        <p:tgtEl>
+                                          <p:spTgt spid="5"/>
+                                        </p:tgtEl>
+                                      </p:cBhvr>
+                                    </p:animEffect>
+                                  </p:childTnLst>
+                                </p:cTn>
+                              </p:par>
+                            </p:childTnLst>
+                          </p:cTn>
+                        </p:par>
+                      </p:childTnLst>
+                    </p:cTn>
+                  </p:par>
+                </p:childTnLst>
+              </p:cTn>
+              <p:prevCondLst>
+                <p:cond evt="onPrev" delay="0">
+                  <p:tgtEl>
+                    <p:sldTgt/>
+                  </p:tgtEl>
+                </p:cond>
+              </p:prevCondLst>
+              <p:nextCondLst>
+                <p:cond evt="onNext" delay="0">
+                  <p:tgtEl>
+                    <p:sldTgt/>
+                  </p:tgtEl>
+                </p:cond>
+              </p:nextCondLst>
+            </p:seq>
+          </p:childTnLst>
+        </p:cTn>
       </p:par>
     </p:tnLst>
+    <p:bldLst>
+      <p:bldP spid="4" grpId="0"/>
+      <p:bldP spid="5" grpId="0" animBg="1"/>
+    </p:bldLst>
   </p:timing>
 </p:sld>
 </file>
@@ -9549,7 +9750,11 @@
             </a:r>
             <a:r>
               <a:rPr lang="en-US" dirty="0" smtClean="0"/>
-              <a:t>  to tell the computer we’re making a thing</a:t>
+              <a:t>  to tell the computer we’re making </a:t>
+            </a:r>
+            <a:r>
+              <a:rPr lang="en-US" smtClean="0"/>
+              <a:t>some data</a:t>
             </a:r>
             <a:endParaRPr lang="en-US" dirty="0"/>
           </a:p>
@@ -9579,7 +9784,15 @@
           <a:p>
             <a:r>
               <a:rPr lang="en-US" b="1" dirty="0" smtClean="0"/>
-              <a:t>A thing can fall into 6 categories</a:t>
+              <a:t>Data </a:t>
+            </a:r>
+            <a:r>
+              <a:rPr lang="en-US" b="1" dirty="0" smtClean="0"/>
+              <a:t>can </a:t>
+            </a:r>
+            <a:r>
+              <a:rPr lang="en-US" b="1" dirty="0" smtClean="0"/>
+              <a:t>fall into 6 categories</a:t>
             </a:r>
             <a:endParaRPr lang="en-US" b="1" dirty="0"/>
           </a:p>

</xml_diff>

<commit_message>
Revised lessons 1 and 2.
</commit_message>
<xml_diff>
--- a/001_why_code/001.pptx
+++ b/001_why_code/001.pptx
@@ -204,7 +204,7 @@
           <a:p>
             <a:fld id="{8C30077F-BF0A-F74B-87CD-8405AF275430}" type="datetimeFigureOut">
               <a:rPr lang="en-US" smtClean="0"/>
-              <a:t>5/16/17</a:t>
+              <a:t>5/17/17</a:t>
             </a:fld>
             <a:endParaRPr lang="en-US"/>
           </a:p>
@@ -603,7 +603,7 @@
           <a:p>
             <a:fld id="{6AD8852D-4624-B943-B935-A57BA735AC85}" type="datetimeFigureOut">
               <a:rPr lang="en-US" smtClean="0"/>
-              <a:t>5/16/17</a:t>
+              <a:t>5/17/17</a:t>
             </a:fld>
             <a:endParaRPr lang="en-US"/>
           </a:p>
@@ -768,7 +768,7 @@
           <a:p>
             <a:fld id="{6AD8852D-4624-B943-B935-A57BA735AC85}" type="datetimeFigureOut">
               <a:rPr lang="en-US" smtClean="0"/>
-              <a:t>5/16/17</a:t>
+              <a:t>5/17/17</a:t>
             </a:fld>
             <a:endParaRPr lang="en-US"/>
           </a:p>
@@ -943,7 +943,7 @@
           <a:p>
             <a:fld id="{6AD8852D-4624-B943-B935-A57BA735AC85}" type="datetimeFigureOut">
               <a:rPr lang="en-US" smtClean="0"/>
-              <a:t>5/16/17</a:t>
+              <a:t>5/17/17</a:t>
             </a:fld>
             <a:endParaRPr lang="en-US"/>
           </a:p>
@@ -1108,7 +1108,7 @@
           <a:p>
             <a:fld id="{6AD8852D-4624-B943-B935-A57BA735AC85}" type="datetimeFigureOut">
               <a:rPr lang="en-US" smtClean="0"/>
-              <a:t>5/16/17</a:t>
+              <a:t>5/17/17</a:t>
             </a:fld>
             <a:endParaRPr lang="en-US"/>
           </a:p>
@@ -1349,7 +1349,7 @@
           <a:p>
             <a:fld id="{6AD8852D-4624-B943-B935-A57BA735AC85}" type="datetimeFigureOut">
               <a:rPr lang="en-US" smtClean="0"/>
-              <a:t>5/16/17</a:t>
+              <a:t>5/17/17</a:t>
             </a:fld>
             <a:endParaRPr lang="en-US"/>
           </a:p>
@@ -1576,7 +1576,7 @@
           <a:p>
             <a:fld id="{6AD8852D-4624-B943-B935-A57BA735AC85}" type="datetimeFigureOut">
               <a:rPr lang="en-US" smtClean="0"/>
-              <a:t>5/16/17</a:t>
+              <a:t>5/17/17</a:t>
             </a:fld>
             <a:endParaRPr lang="en-US"/>
           </a:p>
@@ -1938,7 +1938,7 @@
           <a:p>
             <a:fld id="{6AD8852D-4624-B943-B935-A57BA735AC85}" type="datetimeFigureOut">
               <a:rPr lang="en-US" smtClean="0"/>
-              <a:t>5/16/17</a:t>
+              <a:t>5/17/17</a:t>
             </a:fld>
             <a:endParaRPr lang="en-US"/>
           </a:p>
@@ -2051,7 +2051,7 @@
           <a:p>
             <a:fld id="{6AD8852D-4624-B943-B935-A57BA735AC85}" type="datetimeFigureOut">
               <a:rPr lang="en-US" smtClean="0"/>
-              <a:t>5/16/17</a:t>
+              <a:t>5/17/17</a:t>
             </a:fld>
             <a:endParaRPr lang="en-US"/>
           </a:p>
@@ -2141,7 +2141,7 @@
           <a:p>
             <a:fld id="{6AD8852D-4624-B943-B935-A57BA735AC85}" type="datetimeFigureOut">
               <a:rPr lang="en-US" smtClean="0"/>
-              <a:t>5/16/17</a:t>
+              <a:t>5/17/17</a:t>
             </a:fld>
             <a:endParaRPr lang="en-US"/>
           </a:p>
@@ -2413,7 +2413,7 @@
           <a:p>
             <a:fld id="{6AD8852D-4624-B943-B935-A57BA735AC85}" type="datetimeFigureOut">
               <a:rPr lang="en-US" smtClean="0"/>
-              <a:t>5/16/17</a:t>
+              <a:t>5/17/17</a:t>
             </a:fld>
             <a:endParaRPr lang="en-US"/>
           </a:p>
@@ -2665,7 +2665,7 @@
           <a:p>
             <a:fld id="{6AD8852D-4624-B943-B935-A57BA735AC85}" type="datetimeFigureOut">
               <a:rPr lang="en-US" smtClean="0"/>
-              <a:t>5/16/17</a:t>
+              <a:t>5/17/17</a:t>
             </a:fld>
             <a:endParaRPr lang="en-US"/>
           </a:p>
@@ -2873,7 +2873,7 @@
           <a:p>
             <a:fld id="{6AD8852D-4624-B943-B935-A57BA735AC85}" type="datetimeFigureOut">
               <a:rPr lang="en-US" smtClean="0"/>
-              <a:t>5/16/17</a:t>
+              <a:t>5/17/17</a:t>
             </a:fld>
             <a:endParaRPr lang="en-US"/>
           </a:p>
@@ -3675,50 +3675,42 @@
           </a:p>
         </p:txBody>
       </p:sp>
-      <p:sp>
-        <p:nvSpPr>
-          <p:cNvPr id="5" name="Right Arrow 4"/>
-          <p:cNvSpPr/>
+      <p:cxnSp>
+        <p:nvCxnSpPr>
+          <p:cNvPr id="8" name="Straight Arrow Connector 7"/>
+          <p:cNvCxnSpPr/>
           <p:nvPr/>
-        </p:nvSpPr>
+        </p:nvCxnSpPr>
         <p:spPr>
-          <a:xfrm rot="10800000">
-            <a:off x="6887229" y="2852928"/>
-            <a:ext cx="722376" cy="228600"/>
+          <a:xfrm flipH="1">
+            <a:off x="6473952" y="3008376"/>
+            <a:ext cx="1362456" cy="0"/>
           </a:xfrm>
-          <a:prstGeom prst="rightArrow">
+          <a:prstGeom prst="straightConnector1">
             <a:avLst/>
           </a:prstGeom>
-          <a:noFill/>
-          <a:ln w="28575">
+          <a:ln>
             <a:solidFill>
-              <a:srgbClr val="00B050"/>
+              <a:schemeClr val="tx1"/>
             </a:solidFill>
+            <a:tailEnd type="triangle"/>
           </a:ln>
         </p:spPr>
         <p:style>
-          <a:lnRef idx="2">
-            <a:schemeClr val="accent4"/>
+          <a:lnRef idx="1">
+            <a:schemeClr val="accent1"/>
           </a:lnRef>
-          <a:fillRef idx="1">
-            <a:schemeClr val="lt1"/>
+          <a:fillRef idx="0">
+            <a:schemeClr val="accent1"/>
           </a:fillRef>
           <a:effectRef idx="0">
-            <a:schemeClr val="accent4"/>
+            <a:schemeClr val="accent1"/>
           </a:effectRef>
           <a:fontRef idx="minor">
-            <a:schemeClr val="dk1"/>
+            <a:schemeClr val="tx1"/>
           </a:fontRef>
         </p:style>
-        <p:txBody>
-          <a:bodyPr rtlCol="0" anchor="ctr"/>
-          <a:lstStyle/>
-          <a:p>
-            <a:pPr algn="ctr"/>
-            <a:endParaRPr lang="en-US"/>
-          </a:p>
-        </p:txBody>
-      </p:sp>
+      </p:cxnSp>
     </p:spTree>
     <p:extLst>
       <p:ext uri="{BB962C8B-B14F-4D97-AF65-F5344CB8AC3E}">
@@ -3750,7 +3742,7 @@
                             </p:stCondLst>
                             <p:childTnLst>
                               <p:par>
-                                <p:cTn id="5" presetID="10" presetClass="entr" presetSubtype="0" fill="hold" grpId="0" nodeType="clickEffect">
+                                <p:cTn id="5" presetID="10" presetClass="entr" presetSubtype="0" fill="hold" nodeType="clickEffect">
                                   <p:stCondLst>
                                     <p:cond delay="0"/>
                                   </p:stCondLst>
@@ -3763,7 +3755,7 @@
                                           </p:stCondLst>
                                         </p:cTn>
                                         <p:tgtEl>
-                                          <p:spTgt spid="4"/>
+                                          <p:spTgt spid="8"/>
                                         </p:tgtEl>
                                         <p:attrNameLst>
                                           <p:attrName>style.visibility</p:attrName>
@@ -3777,15 +3769,15 @@
                                       <p:cBhvr>
                                         <p:cTn id="7" dur="500"/>
                                         <p:tgtEl>
-                                          <p:spTgt spid="4"/>
-                                        </p:tgtEl>
-                                      </p:cBhvr>
-                                    </p:animEffect>
-                                  </p:childTnLst>
-                                </p:cTn>
-                              </p:par>
-                              <p:par>
-                                <p:cTn id="8" presetID="10" presetClass="entr" presetSubtype="0" fill="hold" grpId="0" nodeType="withEffect">
+                                          <p:spTgt spid="8"/>
+                                        </p:tgtEl>
+                                      </p:cBhvr>
+                                    </p:animEffect>
+                                  </p:childTnLst>
+                                </p:cTn>
+                              </p:par>
+                              <p:par>
+                                <p:cTn id="8" presetID="10" presetClass="entr" presetSubtype="0" fill="hold" grpId="1" nodeType="withEffect">
                                   <p:stCondLst>
                                     <p:cond delay="0"/>
                                   </p:stCondLst>
@@ -3798,7 +3790,7 @@
                                           </p:stCondLst>
                                         </p:cTn>
                                         <p:tgtEl>
-                                          <p:spTgt spid="5"/>
+                                          <p:spTgt spid="4"/>
                                         </p:tgtEl>
                                         <p:attrNameLst>
                                           <p:attrName>style.visibility</p:attrName>
@@ -3812,7 +3804,7 @@
                                       <p:cBhvr>
                                         <p:cTn id="10" dur="500"/>
                                         <p:tgtEl>
-                                          <p:spTgt spid="5"/>
+                                          <p:spTgt spid="4"/>
                                         </p:tgtEl>
                                       </p:cBhvr>
                                     </p:animEffect>
@@ -3847,8 +3839,7 @@
       </p:par>
     </p:tnLst>
     <p:bldLst>
-      <p:bldP spid="4" grpId="0"/>
-      <p:bldP spid="5" grpId="0" animBg="1"/>
+      <p:bldP spid="4" grpId="1"/>
     </p:bldLst>
   </p:timing>
 </p:sld>
@@ -9222,8 +9213,8 @@
         </p:blipFill>
         <p:spPr>
           <a:xfrm>
-            <a:off x="754380" y="2873186"/>
-            <a:ext cx="1933956" cy="1933956"/>
+            <a:off x="757963" y="3195671"/>
+            <a:ext cx="1417817" cy="1417817"/>
           </a:xfrm>
           <a:prstGeom prst="rect">
             <a:avLst/>
@@ -9239,7 +9230,7 @@
         <p:spPr>
           <a:xfrm>
             <a:off x="2990088" y="2395728"/>
-            <a:ext cx="4282886" cy="1477328"/>
+            <a:ext cx="4282886" cy="2031325"/>
           </a:xfrm>
           <a:prstGeom prst="rect">
             <a:avLst/>
@@ -9278,7 +9269,27 @@
             </a:r>
             <a:r>
               <a:rPr lang="en-US" dirty="0" smtClean="0"/>
-              <a:t>’ property is true</a:t>
+              <a:t>’ property is </a:t>
+            </a:r>
+            <a:r>
+              <a:rPr lang="en-US" dirty="0" smtClean="0"/>
+              <a:t>true</a:t>
+            </a:r>
+          </a:p>
+          <a:p>
+            <a:r>
+              <a:rPr lang="en-US" dirty="0" smtClean="0"/>
+              <a:t>     cross out ones with no fruit</a:t>
+            </a:r>
+          </a:p>
+          <a:p>
+            <a:r>
+              <a:rPr lang="en-US" dirty="0"/>
+              <a:t> </a:t>
+            </a:r>
+            <a:r>
+              <a:rPr lang="en-US" dirty="0" smtClean="0"/>
+              <a:t>    take the remaining trees</a:t>
             </a:r>
             <a:endParaRPr lang="en-US" dirty="0"/>
           </a:p>
@@ -9305,8 +9316,8 @@
         </p:nvSpPr>
         <p:spPr>
           <a:xfrm>
-            <a:off x="2990088" y="3952635"/>
-            <a:ext cx="4282886" cy="1754326"/>
+            <a:off x="2990088" y="4265813"/>
+            <a:ext cx="4282886" cy="2308324"/>
           </a:xfrm>
           <a:prstGeom prst="rect">
             <a:avLst/>
@@ -9347,7 +9358,31 @@
             </a:r>
             <a:r>
               <a:rPr lang="en-US" dirty="0" smtClean="0"/>
-              <a:t>    remember the tallest one</a:t>
+              <a:t>    remember the tallest </a:t>
+            </a:r>
+            <a:r>
+              <a:rPr lang="en-US" dirty="0" smtClean="0"/>
+              <a:t>one</a:t>
+            </a:r>
+          </a:p>
+          <a:p>
+            <a:r>
+              <a:rPr lang="en-US" dirty="0"/>
+              <a:t> </a:t>
+            </a:r>
+            <a:r>
+              <a:rPr lang="en-US" dirty="0" smtClean="0"/>
+              <a:t>    cross out ones that are less than it</a:t>
+            </a:r>
+          </a:p>
+          <a:p>
+            <a:r>
+              <a:rPr lang="en-US" dirty="0"/>
+              <a:t> </a:t>
+            </a:r>
+            <a:r>
+              <a:rPr lang="en-US" dirty="0" smtClean="0"/>
+              <a:t>    take the remaining tree</a:t>
             </a:r>
             <a:endParaRPr lang="en-US" dirty="0"/>
           </a:p>
@@ -9388,9 +9423,6 @@
                     <p:cTn id="3" fill="hold">
                       <p:stCondLst>
                         <p:cond delay="indefinite"/>
-                        <p:cond evt="onBegin" delay="0">
-                          <p:tn val="2"/>
-                        </p:cond>
                       </p:stCondLst>
                       <p:childTnLst>
                         <p:par>
@@ -9400,123 +9432,34 @@
                             </p:stCondLst>
                             <p:childTnLst>
                               <p:par>
-                                <p:cTn id="5" presetID="9" presetClass="emph" presetSubtype="0" nodeType="withEffect">
-                                  <p:stCondLst>
-                                    <p:cond delay="0"/>
-                                  </p:stCondLst>
-                                  <p:childTnLst>
-                                    <p:set>
-                                      <p:cBhvr rctx="PPT">
-                                        <p:cTn id="6" dur="indefinite"/>
-                                        <p:tgtEl>
-                                          <p:spTgt spid="6"/>
-                                        </p:tgtEl>
-                                        <p:attrNameLst>
-                                          <p:attrName>style.opacity</p:attrName>
-                                        </p:attrNameLst>
-                                      </p:cBhvr>
-                                      <p:to>
-                                        <p:strVal val="1"/>
-                                      </p:to>
-                                    </p:set>
-                                    <p:animEffect filter="image" prLst="opacity: 1">
-                                      <p:cBhvr rctx="IE">
-                                        <p:cTn id="7" dur="indefinite"/>
-                                        <p:tgtEl>
-                                          <p:spTgt spid="6"/>
-                                        </p:tgtEl>
-                                      </p:cBhvr>
-                                    </p:animEffect>
-                                  </p:childTnLst>
-                                </p:cTn>
-                              </p:par>
-                              <p:par>
-                                <p:cTn id="8" presetID="9" presetClass="emph" presetSubtype="0" nodeType="withEffect">
-                                  <p:stCondLst>
-                                    <p:cond delay="0"/>
-                                  </p:stCondLst>
-                                  <p:childTnLst>
-                                    <p:set>
-                                      <p:cBhvr rctx="PPT">
-                                        <p:cTn id="9" dur="indefinite"/>
-                                        <p:tgtEl>
-                                          <p:spTgt spid="6"/>
-                                        </p:tgtEl>
-                                        <p:attrNameLst>
-                                          <p:attrName>style.opacity</p:attrName>
-                                        </p:attrNameLst>
-                                      </p:cBhvr>
-                                      <p:to>
-                                        <p:strVal val="0.25"/>
-                                      </p:to>
-                                    </p:set>
-                                    <p:animEffect filter="image" prLst="opacity: 0.25">
-                                      <p:cBhvr rctx="IE">
-                                        <p:cTn id="10" dur="indefinite"/>
-                                        <p:tgtEl>
-                                          <p:spTgt spid="6"/>
-                                        </p:tgtEl>
-                                      </p:cBhvr>
-                                    </p:animEffect>
-                                  </p:childTnLst>
-                                </p:cTn>
-                              </p:par>
-                              <p:par>
-                                <p:cTn id="11" presetID="9" presetClass="emph" presetSubtype="0" nodeType="withEffect">
-                                  <p:stCondLst>
-                                    <p:cond delay="0"/>
-                                  </p:stCondLst>
-                                  <p:childTnLst>
-                                    <p:set>
-                                      <p:cBhvr rctx="PPT">
-                                        <p:cTn id="12" dur="indefinite"/>
-                                        <p:tgtEl>
-                                          <p:spTgt spid="6"/>
-                                        </p:tgtEl>
-                                        <p:attrNameLst>
-                                          <p:attrName>style.opacity</p:attrName>
-                                        </p:attrNameLst>
-                                      </p:cBhvr>
-                                      <p:to>
-                                        <p:strVal val="1"/>
-                                      </p:to>
-                                    </p:set>
-                                    <p:animEffect filter="image" prLst="opacity: 1">
-                                      <p:cBhvr rctx="IE">
-                                        <p:cTn id="13" dur="indefinite"/>
-                                        <p:tgtEl>
-                                          <p:spTgt spid="6"/>
-                                        </p:tgtEl>
-                                      </p:cBhvr>
-                                    </p:animEffect>
-                                  </p:childTnLst>
-                                </p:cTn>
-                              </p:par>
-                              <p:par>
-                                <p:cTn id="14" presetID="9" presetClass="emph" presetSubtype="0" nodeType="withEffect">
-                                  <p:stCondLst>
-                                    <p:cond delay="0"/>
-                                  </p:stCondLst>
-                                  <p:childTnLst>
-                                    <p:set>
-                                      <p:cBhvr rctx="PPT">
-                                        <p:cTn id="15" dur="indefinite"/>
-                                        <p:tgtEl>
-                                          <p:spTgt spid="6"/>
-                                        </p:tgtEl>
-                                        <p:attrNameLst>
-                                          <p:attrName>style.opacity</p:attrName>
-                                        </p:attrNameLst>
-                                      </p:cBhvr>
-                                      <p:to>
-                                        <p:strVal val="0.25"/>
-                                      </p:to>
-                                    </p:set>
-                                    <p:animEffect filter="image" prLst="opacity: 0.25">
-                                      <p:cBhvr rctx="IE">
-                                        <p:cTn id="16" dur="indefinite"/>
-                                        <p:tgtEl>
-                                          <p:spTgt spid="6"/>
+                                <p:cTn id="5" presetID="10" presetClass="entr" presetSubtype="0" fill="hold" grpId="0" nodeType="clickEffect">
+                                  <p:stCondLst>
+                                    <p:cond delay="0"/>
+                                  </p:stCondLst>
+                                  <p:childTnLst>
+                                    <p:set>
+                                      <p:cBhvr>
+                                        <p:cTn id="6" dur="1" fill="hold">
+                                          <p:stCondLst>
+                                            <p:cond delay="0"/>
+                                          </p:stCondLst>
+                                        </p:cTn>
+                                        <p:tgtEl>
+                                          <p:spTgt spid="11"/>
+                                        </p:tgtEl>
+                                        <p:attrNameLst>
+                                          <p:attrName>style.visibility</p:attrName>
+                                        </p:attrNameLst>
+                                      </p:cBhvr>
+                                      <p:to>
+                                        <p:strVal val="visible"/>
+                                      </p:to>
+                                    </p:set>
+                                    <p:animEffect transition="in" filter="fade">
+                                      <p:cBhvr>
+                                        <p:cTn id="7" dur="500"/>
+                                        <p:tgtEl>
+                                          <p:spTgt spid="11"/>
                                         </p:tgtEl>
                                       </p:cBhvr>
                                     </p:animEffect>
@@ -9530,46 +9473,73 @@
                     </p:cTn>
                   </p:par>
                   <p:par>
-                    <p:cTn id="17" fill="hold">
+                    <p:cTn id="8" fill="hold">
                       <p:stCondLst>
                         <p:cond delay="indefinite"/>
                       </p:stCondLst>
                       <p:childTnLst>
                         <p:par>
-                          <p:cTn id="18" fill="hold">
+                          <p:cTn id="9" fill="hold">
                             <p:stCondLst>
                               <p:cond delay="0"/>
                             </p:stCondLst>
                             <p:childTnLst>
                               <p:par>
-                                <p:cTn id="19" presetID="10" presetClass="entr" presetSubtype="0" fill="hold" grpId="0" nodeType="clickEffect">
-                                  <p:stCondLst>
-                                    <p:cond delay="0"/>
-                                  </p:stCondLst>
-                                  <p:childTnLst>
-                                    <p:set>
-                                      <p:cBhvr>
-                                        <p:cTn id="20" dur="1" fill="hold">
-                                          <p:stCondLst>
-                                            <p:cond delay="0"/>
-                                          </p:stCondLst>
-                                        </p:cTn>
-                                        <p:tgtEl>
-                                          <p:spTgt spid="11"/>
-                                        </p:tgtEl>
-                                        <p:attrNameLst>
-                                          <p:attrName>style.visibility</p:attrName>
-                                        </p:attrNameLst>
-                                      </p:cBhvr>
-                                      <p:to>
-                                        <p:strVal val="visible"/>
-                                      </p:to>
-                                    </p:set>
-                                    <p:animEffect transition="in" filter="fade">
-                                      <p:cBhvr>
-                                        <p:cTn id="21" dur="500"/>
-                                        <p:tgtEl>
-                                          <p:spTgt spid="11"/>
+                                <p:cTn id="10" presetID="9" presetClass="emph" presetSubtype="0" nodeType="clickEffect">
+                                  <p:stCondLst>
+                                    <p:cond delay="0"/>
+                                  </p:stCondLst>
+                                  <p:childTnLst>
+                                    <p:set>
+                                      <p:cBhvr rctx="PPT">
+                                        <p:cTn id="11" dur="indefinite"/>
+                                        <p:tgtEl>
+                                          <p:spTgt spid="3"/>
+                                        </p:tgtEl>
+                                        <p:attrNameLst>
+                                          <p:attrName>style.opacity</p:attrName>
+                                        </p:attrNameLst>
+                                      </p:cBhvr>
+                                      <p:to>
+                                        <p:strVal val="0.5"/>
+                                      </p:to>
+                                    </p:set>
+                                    <p:animEffect filter="image" prLst="opacity: 0.5">
+                                      <p:cBhvr rctx="IE">
+                                        <p:cTn id="12" dur="indefinite"/>
+                                        <p:tgtEl>
+                                          <p:spTgt spid="3"/>
+                                        </p:tgtEl>
+                                      </p:cBhvr>
+                                    </p:animEffect>
+                                  </p:childTnLst>
+                                </p:cTn>
+                              </p:par>
+                              <p:par>
+                                <p:cTn id="13" presetID="9" presetClass="emph" presetSubtype="0" grpId="0" nodeType="withEffect">
+                                  <p:stCondLst>
+                                    <p:cond delay="0"/>
+                                  </p:stCondLst>
+                                  <p:childTnLst>
+                                    <p:set>
+                                      <p:cBhvr rctx="PPT">
+                                        <p:cTn id="14" dur="indefinite"/>
+                                        <p:tgtEl>
+                                          <p:spTgt spid="9"/>
+                                        </p:tgtEl>
+                                        <p:attrNameLst>
+                                          <p:attrName>style.opacity</p:attrName>
+                                        </p:attrNameLst>
+                                      </p:cBhvr>
+                                      <p:to>
+                                        <p:strVal val="0.5"/>
+                                      </p:to>
+                                    </p:set>
+                                    <p:animEffect filter="image" prLst="opacity: 0.5">
+                                      <p:cBhvr rctx="IE">
+                                        <p:cTn id="15" dur="indefinite"/>
+                                        <p:tgtEl>
+                                          <p:spTgt spid="9"/>
                                         </p:tgtEl>
                                       </p:cBhvr>
                                     </p:animEffect>
@@ -9583,26 +9553,26 @@
                     </p:cTn>
                   </p:par>
                   <p:par>
-                    <p:cTn id="22" fill="hold">
+                    <p:cTn id="16" fill="hold">
                       <p:stCondLst>
                         <p:cond delay="indefinite"/>
                       </p:stCondLst>
                       <p:childTnLst>
                         <p:par>
-                          <p:cTn id="23" fill="hold">
+                          <p:cTn id="17" fill="hold">
                             <p:stCondLst>
                               <p:cond delay="0"/>
                             </p:stCondLst>
                             <p:childTnLst>
                               <p:par>
-                                <p:cTn id="24" presetID="10" presetClass="entr" presetSubtype="0" fill="hold" grpId="0" nodeType="clickEffect">
+                                <p:cTn id="18" presetID="10" presetClass="entr" presetSubtype="0" fill="hold" grpId="0" nodeType="clickEffect">
                                   <p:stCondLst>
                                     <p:cond delay="0"/>
                                   </p:stCondLst>
                                   <p:childTnLst>
                                     <p:set>
                                       <p:cBhvr>
-                                        <p:cTn id="25" dur="1" fill="hold">
+                                        <p:cTn id="19" dur="1" fill="hold">
                                           <p:stCondLst>
                                             <p:cond delay="0"/>
                                           </p:stCondLst>
@@ -9620,9 +9590,231 @@
                                     </p:set>
                                     <p:animEffect transition="in" filter="fade">
                                       <p:cBhvr>
-                                        <p:cTn id="26" dur="500"/>
+                                        <p:cTn id="20" dur="500"/>
                                         <p:tgtEl>
                                           <p:spTgt spid="12"/>
+                                        </p:tgtEl>
+                                      </p:cBhvr>
+                                    </p:animEffect>
+                                  </p:childTnLst>
+                                </p:cTn>
+                              </p:par>
+                              <p:par>
+                                <p:cTn id="21" presetID="9" presetClass="emph" presetSubtype="0" nodeType="withEffect">
+                                  <p:stCondLst>
+                                    <p:cond delay="0"/>
+                                  </p:stCondLst>
+                                  <p:childTnLst>
+                                    <p:set>
+                                      <p:cBhvr rctx="PPT">
+                                        <p:cTn id="22" dur="indefinite"/>
+                                        <p:tgtEl>
+                                          <p:spTgt spid="3"/>
+                                        </p:tgtEl>
+                                        <p:attrNameLst>
+                                          <p:attrName>style.opacity</p:attrName>
+                                        </p:attrNameLst>
+                                      </p:cBhvr>
+                                      <p:to>
+                                        <p:strVal val="1"/>
+                                      </p:to>
+                                    </p:set>
+                                    <p:animEffect filter="image" prLst="opacity: 1">
+                                      <p:cBhvr rctx="IE">
+                                        <p:cTn id="23" dur="indefinite"/>
+                                        <p:tgtEl>
+                                          <p:spTgt spid="3"/>
+                                        </p:tgtEl>
+                                      </p:cBhvr>
+                                    </p:animEffect>
+                                  </p:childTnLst>
+                                </p:cTn>
+                              </p:par>
+                              <p:par>
+                                <p:cTn id="24" presetID="9" presetClass="emph" presetSubtype="0" grpId="1" nodeType="withEffect">
+                                  <p:stCondLst>
+                                    <p:cond delay="0"/>
+                                  </p:stCondLst>
+                                  <p:childTnLst>
+                                    <p:set>
+                                      <p:cBhvr rctx="PPT">
+                                        <p:cTn id="25" dur="indefinite"/>
+                                        <p:tgtEl>
+                                          <p:spTgt spid="9"/>
+                                        </p:tgtEl>
+                                        <p:attrNameLst>
+                                          <p:attrName>style.opacity</p:attrName>
+                                        </p:attrNameLst>
+                                      </p:cBhvr>
+                                      <p:to>
+                                        <p:strVal val="1"/>
+                                      </p:to>
+                                    </p:set>
+                                    <p:animEffect filter="image" prLst="opacity: 1">
+                                      <p:cBhvr rctx="IE">
+                                        <p:cTn id="26" dur="indefinite"/>
+                                        <p:tgtEl>
+                                          <p:spTgt spid="9"/>
+                                        </p:tgtEl>
+                                      </p:cBhvr>
+                                    </p:animEffect>
+                                  </p:childTnLst>
+                                </p:cTn>
+                              </p:par>
+                            </p:childTnLst>
+                          </p:cTn>
+                        </p:par>
+                      </p:childTnLst>
+                    </p:cTn>
+                  </p:par>
+                  <p:par>
+                    <p:cTn id="27" fill="hold">
+                      <p:stCondLst>
+                        <p:cond delay="indefinite"/>
+                      </p:stCondLst>
+                      <p:childTnLst>
+                        <p:par>
+                          <p:cTn id="28" fill="hold">
+                            <p:stCondLst>
+                              <p:cond delay="0"/>
+                            </p:stCondLst>
+                            <p:childTnLst>
+                              <p:par>
+                                <p:cTn id="29" presetID="9" presetClass="emph" presetSubtype="0" nodeType="clickEffect">
+                                  <p:stCondLst>
+                                    <p:cond delay="0"/>
+                                  </p:stCondLst>
+                                  <p:childTnLst>
+                                    <p:set>
+                                      <p:cBhvr rctx="PPT">
+                                        <p:cTn id="30" dur="indefinite"/>
+                                        <p:tgtEl>
+                                          <p:spTgt spid="5"/>
+                                        </p:tgtEl>
+                                        <p:attrNameLst>
+                                          <p:attrName>style.opacity</p:attrName>
+                                        </p:attrNameLst>
+                                      </p:cBhvr>
+                                      <p:to>
+                                        <p:strVal val="0.5"/>
+                                      </p:to>
+                                    </p:set>
+                                    <p:animEffect filter="image" prLst="opacity: 0.5">
+                                      <p:cBhvr rctx="IE">
+                                        <p:cTn id="31" dur="indefinite"/>
+                                        <p:tgtEl>
+                                          <p:spTgt spid="5"/>
+                                        </p:tgtEl>
+                                      </p:cBhvr>
+                                    </p:animEffect>
+                                  </p:childTnLst>
+                                </p:cTn>
+                              </p:par>
+                              <p:par>
+                                <p:cTn id="32" presetID="9" presetClass="emph" presetSubtype="0" grpId="0" nodeType="withEffect">
+                                  <p:stCondLst>
+                                    <p:cond delay="0"/>
+                                  </p:stCondLst>
+                                  <p:childTnLst>
+                                    <p:set>
+                                      <p:cBhvr rctx="PPT">
+                                        <p:cTn id="33" dur="indefinite"/>
+                                        <p:tgtEl>
+                                          <p:spTgt spid="4"/>
+                                        </p:tgtEl>
+                                        <p:attrNameLst>
+                                          <p:attrName>style.opacity</p:attrName>
+                                        </p:attrNameLst>
+                                      </p:cBhvr>
+                                      <p:to>
+                                        <p:strVal val="0.5"/>
+                                      </p:to>
+                                    </p:set>
+                                    <p:animEffect filter="image" prLst="opacity: 0.5">
+                                      <p:cBhvr rctx="IE">
+                                        <p:cTn id="34" dur="indefinite"/>
+                                        <p:tgtEl>
+                                          <p:spTgt spid="4"/>
+                                        </p:tgtEl>
+                                      </p:cBhvr>
+                                    </p:animEffect>
+                                  </p:childTnLst>
+                                </p:cTn>
+                              </p:par>
+                            </p:childTnLst>
+                          </p:cTn>
+                        </p:par>
+                      </p:childTnLst>
+                    </p:cTn>
+                  </p:par>
+                  <p:par>
+                    <p:cTn id="35" fill="hold">
+                      <p:stCondLst>
+                        <p:cond delay="indefinite"/>
+                      </p:stCondLst>
+                      <p:childTnLst>
+                        <p:par>
+                          <p:cTn id="36" fill="hold">
+                            <p:stCondLst>
+                              <p:cond delay="0"/>
+                            </p:stCondLst>
+                            <p:childTnLst>
+                              <p:par>
+                                <p:cTn id="37" presetID="9" presetClass="emph" presetSubtype="0" nodeType="clickEffect">
+                                  <p:stCondLst>
+                                    <p:cond delay="0"/>
+                                  </p:stCondLst>
+                                  <p:childTnLst>
+                                    <p:set>
+                                      <p:cBhvr rctx="PPT">
+                                        <p:cTn id="38" dur="indefinite"/>
+                                        <p:tgtEl>
+                                          <p:spTgt spid="3"/>
+                                        </p:tgtEl>
+                                        <p:attrNameLst>
+                                          <p:attrName>style.opacity</p:attrName>
+                                        </p:attrNameLst>
+                                      </p:cBhvr>
+                                      <p:to>
+                                        <p:strVal val="0.5"/>
+                                      </p:to>
+                                    </p:set>
+                                    <p:animEffect filter="image" prLst="opacity: 0.5">
+                                      <p:cBhvr rctx="IE">
+                                        <p:cTn id="39" dur="indefinite"/>
+                                        <p:tgtEl>
+                                          <p:spTgt spid="3"/>
+                                        </p:tgtEl>
+                                      </p:cBhvr>
+                                    </p:animEffect>
+                                  </p:childTnLst>
+                                </p:cTn>
+                              </p:par>
+                              <p:par>
+                                <p:cTn id="40" presetID="9" presetClass="emph" presetSubtype="0" grpId="2" nodeType="withEffect">
+                                  <p:stCondLst>
+                                    <p:cond delay="0"/>
+                                  </p:stCondLst>
+                                  <p:childTnLst>
+                                    <p:set>
+                                      <p:cBhvr rctx="PPT">
+                                        <p:cTn id="41" dur="indefinite"/>
+                                        <p:tgtEl>
+                                          <p:spTgt spid="9"/>
+                                        </p:tgtEl>
+                                        <p:attrNameLst>
+                                          <p:attrName>style.opacity</p:attrName>
+                                        </p:attrNameLst>
+                                      </p:cBhvr>
+                                      <p:to>
+                                        <p:strVal val="0.5"/>
+                                      </p:to>
+                                    </p:set>
+                                    <p:animEffect filter="image" prLst="opacity: 0.5">
+                                      <p:cBhvr rctx="IE">
+                                        <p:cTn id="42" dur="indefinite"/>
+                                        <p:tgtEl>
+                                          <p:spTgt spid="9"/>
                                         </p:tgtEl>
                                       </p:cBhvr>
                                     </p:animEffect>
@@ -9657,6 +9849,10 @@
       </p:par>
     </p:tnLst>
     <p:bldLst>
+      <p:bldP spid="4" grpId="0"/>
+      <p:bldP spid="9" grpId="0"/>
+      <p:bldP spid="9" grpId="1"/>
+      <p:bldP spid="9" grpId="2"/>
       <p:bldP spid="11" grpId="0"/>
       <p:bldP spid="12" grpId="0"/>
     </p:bldLst>
@@ -9784,15 +9980,7 @@
           <a:p>
             <a:r>
               <a:rPr lang="en-US" b="1" dirty="0" smtClean="0"/>
-              <a:t>Data </a:t>
-            </a:r>
-            <a:r>
-              <a:rPr lang="en-US" b="1" dirty="0" smtClean="0"/>
-              <a:t>can </a:t>
-            </a:r>
-            <a:r>
-              <a:rPr lang="en-US" b="1" dirty="0" smtClean="0"/>
-              <a:t>fall into 6 categories</a:t>
+              <a:t>Data can fall into 6 categories</a:t>
             </a:r>
             <a:endParaRPr lang="en-US" b="1" dirty="0"/>
           </a:p>

</xml_diff>